<commit_message>
final stuff on poster
</commit_message>
<xml_diff>
--- a/poster/neurips.pptx
+++ b/poster/neurips.pptx
@@ -692,7 +692,7 @@
           </a:ln>
           <a:extLst>
             <a:ext uri="{C572A759-6A51-4108-AA02-DFA0A04FC94B}">
-              <ma14:wrappingTextBoxFlag xmlns="" xmlns:m="http://schemas.openxmlformats.org/officeDocument/2006/math" xmlns:a14="http://schemas.microsoft.com/office/drawing/2010/main" xmlns:ma14="http://schemas.microsoft.com/office/mac/drawingml/2011/main" val="1"/>
+              <ma14:wrappingTextBoxFlag xmlns:ma14="http://schemas.microsoft.com/office/mac/drawingml/2011/main" xmlns:a14="http://schemas.microsoft.com/office/drawing/2010/main" xmlns:m="http://schemas.openxmlformats.org/officeDocument/2006/math" xmlns="" val="1"/>
             </a:ext>
           </a:extLst>
         </p:spPr>
@@ -729,7 +729,7 @@
           </a:ln>
           <a:extLst>
             <a:ext uri="{C572A759-6A51-4108-AA02-DFA0A04FC94B}">
-              <ma14:wrappingTextBoxFlag xmlns="" xmlns:m="http://schemas.openxmlformats.org/officeDocument/2006/math" xmlns:a14="http://schemas.microsoft.com/office/drawing/2010/main" xmlns:ma14="http://schemas.microsoft.com/office/mac/drawingml/2011/main" val="1"/>
+              <ma14:wrappingTextBoxFlag xmlns:ma14="http://schemas.microsoft.com/office/mac/drawingml/2011/main" xmlns:a14="http://schemas.microsoft.com/office/drawing/2010/main" xmlns:m="http://schemas.openxmlformats.org/officeDocument/2006/math" xmlns="" val="1"/>
             </a:ext>
           </a:extLst>
         </p:spPr>
@@ -1561,7 +1561,7 @@
           </a:ln>
           <a:extLst>
             <a:ext uri="{C572A759-6A51-4108-AA02-DFA0A04FC94B}">
-              <ma14:wrappingTextBoxFlag xmlns="" xmlns:m="http://schemas.openxmlformats.org/officeDocument/2006/math" xmlns:a14="http://schemas.microsoft.com/office/drawing/2010/main" xmlns:ma14="http://schemas.microsoft.com/office/mac/drawingml/2011/main" val="1"/>
+              <ma14:wrappingTextBoxFlag xmlns:ma14="http://schemas.microsoft.com/office/mac/drawingml/2011/main" xmlns:a14="http://schemas.microsoft.com/office/drawing/2010/main" xmlns:m="http://schemas.openxmlformats.org/officeDocument/2006/math" xmlns="" val="1"/>
             </a:ext>
           </a:extLst>
         </p:spPr>
@@ -1606,7 +1606,7 @@
           </a:ln>
           <a:extLst>
             <a:ext uri="{C572A759-6A51-4108-AA02-DFA0A04FC94B}">
-              <ma14:wrappingTextBoxFlag xmlns="" xmlns:m="http://schemas.openxmlformats.org/officeDocument/2006/math" xmlns:a14="http://schemas.microsoft.com/office/drawing/2010/main" xmlns:ma14="http://schemas.microsoft.com/office/mac/drawingml/2011/main" val="1"/>
+              <ma14:wrappingTextBoxFlag xmlns:ma14="http://schemas.microsoft.com/office/mac/drawingml/2011/main" xmlns:a14="http://schemas.microsoft.com/office/drawing/2010/main" xmlns:m="http://schemas.openxmlformats.org/officeDocument/2006/math" xmlns="" val="1"/>
             </a:ext>
           </a:extLst>
         </p:spPr>
@@ -1652,7 +1652,7 @@
           </a:ln>
           <a:extLst>
             <a:ext uri="{C572A759-6A51-4108-AA02-DFA0A04FC94B}">
-              <ma14:wrappingTextBoxFlag xmlns="" xmlns:m="http://schemas.openxmlformats.org/officeDocument/2006/math" xmlns:a14="http://schemas.microsoft.com/office/drawing/2010/main" xmlns:ma14="http://schemas.microsoft.com/office/mac/drawingml/2011/main" val="1"/>
+              <ma14:wrappingTextBoxFlag xmlns:ma14="http://schemas.microsoft.com/office/mac/drawingml/2011/main" xmlns:a14="http://schemas.microsoft.com/office/drawing/2010/main" xmlns:m="http://schemas.openxmlformats.org/officeDocument/2006/math" xmlns="" val="1"/>
             </a:ext>
           </a:extLst>
         </p:spPr>
@@ -1727,7 +1727,7 @@
           </a:ln>
           <a:extLst>
             <a:ext uri="{C572A759-6A51-4108-AA02-DFA0A04FC94B}">
-              <ma14:wrappingTextBoxFlag xmlns="" xmlns:m="http://schemas.openxmlformats.org/officeDocument/2006/math" xmlns:a14="http://schemas.microsoft.com/office/drawing/2010/main" xmlns:ma14="http://schemas.microsoft.com/office/mac/drawingml/2011/main" val="1"/>
+              <ma14:wrappingTextBoxFlag xmlns:ma14="http://schemas.microsoft.com/office/mac/drawingml/2011/main" xmlns:a14="http://schemas.microsoft.com/office/drawing/2010/main" xmlns:m="http://schemas.openxmlformats.org/officeDocument/2006/math" xmlns="" val="1"/>
             </a:ext>
           </a:extLst>
         </p:spPr>
@@ -1754,7 +1754,7 @@
           <a:p>
             <a:r>
               <a:rPr lang="en-GB" dirty="0"/>
-              <a:t>For a our baseline comparison we keep things simple: for example, we let the conventional VAR guide our search for optimal lag length. A short exercise in hyperparameter tuning demonstrates that the Deep VAR is less prone to overfitting with respect to the number of lags. </a:t>
+              <a:t>For a our baseline comparison we keep things simple: for example, we let the conventional VAR guide our search for optimal lag length. A short exercise in hyperparameter tuning demonstrates that the Deep VAR is less prone to overfitting with respect to the number of lags among other things. </a:t>
             </a:r>
           </a:p>
         </p:txBody>
@@ -1778,7 +1778,7 @@
           </a:ln>
           <a:extLst>
             <a:ext uri="{C572A759-6A51-4108-AA02-DFA0A04FC94B}">
-              <ma14:wrappingTextBoxFlag xmlns="" xmlns:m="http://schemas.openxmlformats.org/officeDocument/2006/math" xmlns:a14="http://schemas.microsoft.com/office/drawing/2010/main" xmlns:ma14="http://schemas.microsoft.com/office/mac/drawingml/2011/main" val="1"/>
+              <ma14:wrappingTextBoxFlag xmlns:ma14="http://schemas.microsoft.com/office/mac/drawingml/2011/main" xmlns:a14="http://schemas.microsoft.com/office/drawing/2010/main" xmlns:m="http://schemas.openxmlformats.org/officeDocument/2006/math" xmlns="" val="1"/>
             </a:ext>
           </a:extLst>
         </p:spPr>
@@ -1859,7 +1859,7 @@
             </a:r>
             <a:r>
               <a:rPr lang="en-US" dirty="0">
-                <a:hlinkClick r:id="rId4"/>
+                <a:hlinkClick r:id="rId3"/>
               </a:rPr>
               <a:t>R package</a:t>
             </a:r>
@@ -1890,7 +1890,7 @@
           </a:ln>
           <a:extLst>
             <a:ext uri="{C572A759-6A51-4108-AA02-DFA0A04FC94B}">
-              <ma14:wrappingTextBoxFlag xmlns="" xmlns:m="http://schemas.openxmlformats.org/officeDocument/2006/math" xmlns:a14="http://schemas.microsoft.com/office/drawing/2010/main" xmlns:ma14="http://schemas.microsoft.com/office/mac/drawingml/2011/main" val="1"/>
+              <ma14:wrappingTextBoxFlag xmlns:ma14="http://schemas.microsoft.com/office/mac/drawingml/2011/main" xmlns:a14="http://schemas.microsoft.com/office/drawing/2010/main" xmlns:m="http://schemas.openxmlformats.org/officeDocument/2006/math" xmlns="" val="1"/>
             </a:ext>
           </a:extLst>
         </p:spPr>
@@ -1936,7 +1936,7 @@
           </a:ln>
           <a:extLst>
             <a:ext uri="{C572A759-6A51-4108-AA02-DFA0A04FC94B}">
-              <ma14:wrappingTextBoxFlag xmlns="" xmlns:m="http://schemas.openxmlformats.org/officeDocument/2006/math" xmlns:a14="http://schemas.microsoft.com/office/drawing/2010/main" xmlns:ma14="http://schemas.microsoft.com/office/mac/drawingml/2011/main" val="1"/>
+              <ma14:wrappingTextBoxFlag xmlns:ma14="http://schemas.microsoft.com/office/mac/drawingml/2011/main" xmlns:a14="http://schemas.microsoft.com/office/drawing/2010/main" xmlns:m="http://schemas.openxmlformats.org/officeDocument/2006/math" xmlns="" val="1"/>
             </a:ext>
           </a:extLst>
         </p:spPr>
@@ -1982,7 +1982,7 @@
           </a:ln>
           <a:extLst>
             <a:ext uri="{C572A759-6A51-4108-AA02-DFA0A04FC94B}">
-              <ma14:wrappingTextBoxFlag xmlns="" xmlns:m="http://schemas.openxmlformats.org/officeDocument/2006/math" xmlns:a14="http://schemas.microsoft.com/office/drawing/2010/main" xmlns:ma14="http://schemas.microsoft.com/office/mac/drawingml/2011/main" val="1"/>
+              <ma14:wrappingTextBoxFlag xmlns:ma14="http://schemas.microsoft.com/office/mac/drawingml/2011/main" xmlns:a14="http://schemas.microsoft.com/office/drawing/2010/main" xmlns:m="http://schemas.openxmlformats.org/officeDocument/2006/math" xmlns="" val="1"/>
             </a:ext>
           </a:extLst>
         </p:spPr>
@@ -2028,7 +2028,7 @@
           </a:ln>
           <a:extLst>
             <a:ext uri="{C572A759-6A51-4108-AA02-DFA0A04FC94B}">
-              <ma14:wrappingTextBoxFlag xmlns="" xmlns:m="http://schemas.openxmlformats.org/officeDocument/2006/math" xmlns:a14="http://schemas.microsoft.com/office/drawing/2010/main" xmlns:ma14="http://schemas.microsoft.com/office/mac/drawingml/2011/main" val="1"/>
+              <ma14:wrappingTextBoxFlag xmlns:ma14="http://schemas.microsoft.com/office/mac/drawingml/2011/main" xmlns:a14="http://schemas.microsoft.com/office/drawing/2010/main" xmlns:m="http://schemas.openxmlformats.org/officeDocument/2006/math" xmlns="" val="1"/>
             </a:ext>
           </a:extLst>
         </p:spPr>
@@ -2074,7 +2074,7 @@
           </a:ln>
           <a:extLst>
             <a:ext uri="{C572A759-6A51-4108-AA02-DFA0A04FC94B}">
-              <ma14:wrappingTextBoxFlag xmlns="" xmlns:m="http://schemas.openxmlformats.org/officeDocument/2006/math" xmlns:a14="http://schemas.microsoft.com/office/drawing/2010/main" xmlns:ma14="http://schemas.microsoft.com/office/mac/drawingml/2011/main" val="1"/>
+              <ma14:wrappingTextBoxFlag xmlns:ma14="http://schemas.microsoft.com/office/mac/drawingml/2011/main" xmlns:a14="http://schemas.microsoft.com/office/drawing/2010/main" xmlns:m="http://schemas.openxmlformats.org/officeDocument/2006/math" xmlns="" val="1"/>
             </a:ext>
           </a:extLst>
         </p:spPr>
@@ -2149,7 +2149,7 @@
           </a:ln>
           <a:extLst>
             <a:ext uri="{C572A759-6A51-4108-AA02-DFA0A04FC94B}">
-              <ma14:wrappingTextBoxFlag xmlns="" xmlns:m="http://schemas.openxmlformats.org/officeDocument/2006/math" xmlns:a14="http://schemas.microsoft.com/office/drawing/2010/main" xmlns:ma14="http://schemas.microsoft.com/office/mac/drawingml/2011/main" val="1"/>
+              <ma14:wrappingTextBoxFlag xmlns:ma14="http://schemas.microsoft.com/office/mac/drawingml/2011/main" xmlns:a14="http://schemas.microsoft.com/office/drawing/2010/main" xmlns:m="http://schemas.openxmlformats.org/officeDocument/2006/math" xmlns="" val="1"/>
             </a:ext>
           </a:extLst>
         </p:spPr>
@@ -2195,7 +2195,7 @@
           </a:ln>
           <a:extLst>
             <a:ext uri="{C572A759-6A51-4108-AA02-DFA0A04FC94B}">
-              <ma14:wrappingTextBoxFlag xmlns="" xmlns:m="http://schemas.openxmlformats.org/officeDocument/2006/math" xmlns:a14="http://schemas.microsoft.com/office/drawing/2010/main" xmlns:ma14="http://schemas.microsoft.com/office/mac/drawingml/2011/main" val="1"/>
+              <ma14:wrappingTextBoxFlag xmlns:ma14="http://schemas.microsoft.com/office/mac/drawingml/2011/main" xmlns:a14="http://schemas.microsoft.com/office/drawing/2010/main" xmlns:m="http://schemas.openxmlformats.org/officeDocument/2006/math" xmlns="" val="1"/>
             </a:ext>
           </a:extLst>
         </p:spPr>
@@ -2241,7 +2241,7 @@
           </a:ln>
           <a:extLst>
             <a:ext uri="{C572A759-6A51-4108-AA02-DFA0A04FC94B}">
-              <ma14:wrappingTextBoxFlag xmlns="" xmlns:m="http://schemas.openxmlformats.org/officeDocument/2006/math" xmlns:a14="http://schemas.microsoft.com/office/drawing/2010/main" xmlns:ma14="http://schemas.microsoft.com/office/mac/drawingml/2011/main" val="1"/>
+              <ma14:wrappingTextBoxFlag xmlns:ma14="http://schemas.microsoft.com/office/mac/drawingml/2011/main" xmlns:a14="http://schemas.microsoft.com/office/drawing/2010/main" xmlns:m="http://schemas.openxmlformats.org/officeDocument/2006/math" xmlns="" val="1"/>
             </a:ext>
           </a:extLst>
         </p:spPr>
@@ -2312,7 +2312,7 @@
             </a:pPr>
             <a:r>
               <a:rPr lang="en-US" dirty="0"/>
-              <a:t>Can the existing toolbox (IRFs, variance decomposition, policy counterfactuals) be built?</a:t>
+              <a:t>Can the existing toolbox (IRFs, variance decomposition, policy counterfactuals, …) be derived for Deep VAR?</a:t>
             </a:r>
           </a:p>
           <a:p>
@@ -2361,7 +2361,7 @@
           </a:ln>
           <a:extLst>
             <a:ext uri="{C572A759-6A51-4108-AA02-DFA0A04FC94B}">
-              <ma14:wrappingTextBoxFlag xmlns="" xmlns:m="http://schemas.openxmlformats.org/officeDocument/2006/math" xmlns:a14="http://schemas.microsoft.com/office/drawing/2010/main" xmlns:ma14="http://schemas.microsoft.com/office/mac/drawingml/2011/main" val="1"/>
+              <ma14:wrappingTextBoxFlag xmlns:ma14="http://schemas.microsoft.com/office/mac/drawingml/2011/main" xmlns:a14="http://schemas.microsoft.com/office/drawing/2010/main" xmlns:m="http://schemas.openxmlformats.org/officeDocument/2006/math" xmlns="" val="1"/>
             </a:ext>
           </a:extLst>
         </p:spPr>
@@ -2406,7 +2406,7 @@
           </a:ln>
           <a:extLst>
             <a:ext uri="{C572A759-6A51-4108-AA02-DFA0A04FC94B}">
-              <ma14:wrappingTextBoxFlag xmlns="" xmlns:m="http://schemas.openxmlformats.org/officeDocument/2006/math" xmlns:a14="http://schemas.microsoft.com/office/drawing/2010/main" xmlns:ma14="http://schemas.microsoft.com/office/mac/drawingml/2011/main" val="1"/>
+              <ma14:wrappingTextBoxFlag xmlns:ma14="http://schemas.microsoft.com/office/mac/drawingml/2011/main" xmlns:a14="http://schemas.microsoft.com/office/drawing/2010/main" xmlns:m="http://schemas.openxmlformats.org/officeDocument/2006/math" xmlns="" val="1"/>
             </a:ext>
           </a:extLst>
         </p:spPr>
@@ -2777,7 +2777,7 @@
           </a:ln>
           <a:extLst>
             <a:ext uri="{C572A759-6A51-4108-AA02-DFA0A04FC94B}">
-              <ma14:wrappingTextBoxFlag xmlns="" xmlns:m="http://schemas.openxmlformats.org/officeDocument/2006/math" xmlns:a14="http://schemas.microsoft.com/office/drawing/2010/main" xmlns:ma14="http://schemas.microsoft.com/office/mac/drawingml/2011/main" val="1"/>
+              <ma14:wrappingTextBoxFlag xmlns:ma14="http://schemas.microsoft.com/office/mac/drawingml/2011/main" xmlns:a14="http://schemas.microsoft.com/office/drawing/2010/main" xmlns:m="http://schemas.openxmlformats.org/officeDocument/2006/math" xmlns="" val="1"/>
             </a:ext>
           </a:extLst>
         </p:spPr>
@@ -2876,7 +2876,7 @@
           <p:nvPr/>
         </p:nvPicPr>
         <p:blipFill>
-          <a:blip r:embed="rId5"/>
+          <a:blip r:embed="rId4"/>
           <a:stretch>
             <a:fillRect/>
           </a:stretch>
@@ -2919,7 +2919,7 @@
           </a:ln>
           <a:extLst>
             <a:ext uri="{C572A759-6A51-4108-AA02-DFA0A04FC94B}">
-              <ma14:wrappingTextBoxFlag xmlns="" xmlns:m="http://schemas.openxmlformats.org/officeDocument/2006/math" xmlns:a14="http://schemas.microsoft.com/office/drawing/2010/main" xmlns:ma14="http://schemas.microsoft.com/office/mac/drawingml/2011/main" val="1"/>
+              <ma14:wrappingTextBoxFlag xmlns:ma14="http://schemas.microsoft.com/office/mac/drawingml/2011/main" xmlns:a14="http://schemas.microsoft.com/office/drawing/2010/main" xmlns:m="http://schemas.openxmlformats.org/officeDocument/2006/math" xmlns="" val="1"/>
             </a:ext>
           </a:extLst>
         </p:spPr>
@@ -2985,7 +2985,7 @@
             </a:ln>
             <a:extLst>
               <a:ext uri="{C572A759-6A51-4108-AA02-DFA0A04FC94B}">
-                <ma14:wrappingTextBoxFlag xmlns="" xmlns:m="http://schemas.openxmlformats.org/officeDocument/2006/math" xmlns:a14="http://schemas.microsoft.com/office/drawing/2010/main" xmlns:ma14="http://schemas.microsoft.com/office/mac/drawingml/2011/main" val="1"/>
+                <ma14:wrappingTextBoxFlag xmlns:ma14="http://schemas.microsoft.com/office/mac/drawingml/2011/main" xmlns:a14="http://schemas.microsoft.com/office/drawing/2010/main" xmlns:m="http://schemas.openxmlformats.org/officeDocument/2006/math" xmlns="" val="1"/>
               </a:ext>
             </a:extLst>
           </p:spPr>
@@ -3037,7 +3037,7 @@
             <p:nvPr/>
           </p:nvPicPr>
           <p:blipFill>
-            <a:blip r:embed="rId6">
+            <a:blip r:embed="rId5">
               <a:extLst>
                 <a:ext uri="{28A0092B-C50C-407E-A947-70E740481C1C}">
                   <a14:useLocalDpi xmlns:a14="http://schemas.microsoft.com/office/drawing/2010/main" val="0"/>
@@ -3109,7 +3109,7 @@
             </a:ln>
             <a:extLst>
               <a:ext uri="{C572A759-6A51-4108-AA02-DFA0A04FC94B}">
-                <ma14:wrappingTextBoxFlag xmlns="" xmlns:m="http://schemas.openxmlformats.org/officeDocument/2006/math" xmlns:a14="http://schemas.microsoft.com/office/drawing/2010/main" xmlns:ma14="http://schemas.microsoft.com/office/mac/drawingml/2011/main" val="1"/>
+                <ma14:wrappingTextBoxFlag xmlns:ma14="http://schemas.microsoft.com/office/mac/drawingml/2011/main" xmlns:a14="http://schemas.microsoft.com/office/drawing/2010/main" xmlns:m="http://schemas.openxmlformats.org/officeDocument/2006/math" xmlns="" val="1"/>
               </a:ext>
             </a:extLst>
           </p:spPr>
@@ -3158,7 +3158,7 @@
             <p:nvPr/>
           </p:nvPicPr>
           <p:blipFill>
-            <a:blip r:embed="rId7">
+            <a:blip r:embed="rId6">
               <a:extLst>
                 <a:ext uri="{28A0092B-C50C-407E-A947-70E740481C1C}">
                   <a14:useLocalDpi xmlns:a14="http://schemas.microsoft.com/office/drawing/2010/main" val="0"/>
@@ -3206,7 +3206,7 @@
           <p:nvPr/>
         </p:nvPicPr>
         <p:blipFill>
-          <a:blip r:embed="rId8">
+          <a:blip r:embed="rId7">
             <a:extLst>
               <a:ext uri="{28A0092B-C50C-407E-A947-70E740481C1C}">
                 <a14:useLocalDpi xmlns:a14="http://schemas.microsoft.com/office/drawing/2010/main" val="0"/>
@@ -3242,7 +3242,7 @@
           <p:nvPr/>
         </p:nvPicPr>
         <p:blipFill>
-          <a:blip r:embed="rId9">
+          <a:blip r:embed="rId8">
             <a:extLst>
               <a:ext uri="{28A0092B-C50C-407E-A947-70E740481C1C}">
                 <a14:useLocalDpi xmlns:a14="http://schemas.microsoft.com/office/drawing/2010/main" val="0"/>
@@ -3278,7 +3278,7 @@
           <p:nvPr/>
         </p:nvPicPr>
         <p:blipFill>
-          <a:blip r:embed="rId10">
+          <a:blip r:embed="rId9">
             <a:extLst>
               <a:ext uri="{28A0092B-C50C-407E-A947-70E740481C1C}">
                 <a14:useLocalDpi xmlns:a14="http://schemas.microsoft.com/office/drawing/2010/main" val="0"/>
@@ -3324,7 +3324,7 @@
           </a:ln>
           <a:extLst>
             <a:ext uri="{C572A759-6A51-4108-AA02-DFA0A04FC94B}">
-              <ma14:wrappingTextBoxFlag xmlns="" xmlns:m="http://schemas.openxmlformats.org/officeDocument/2006/math" xmlns:a14="http://schemas.microsoft.com/office/drawing/2010/main" xmlns:ma14="http://schemas.microsoft.com/office/mac/drawingml/2011/main" val="1"/>
+              <ma14:wrappingTextBoxFlag xmlns:ma14="http://schemas.microsoft.com/office/mac/drawingml/2011/main" xmlns:a14="http://schemas.microsoft.com/office/drawing/2010/main" xmlns:m="http://schemas.openxmlformats.org/officeDocument/2006/math" xmlns="" val="1"/>
             </a:ext>
           </a:extLst>
         </p:spPr>
@@ -3416,7 +3416,7 @@
             <p:nvPr/>
           </p:nvPicPr>
           <p:blipFill>
-            <a:blip r:embed="rId11">
+            <a:blip r:embed="rId10">
               <a:extLst>
                 <a:ext uri="{28A0092B-C50C-407E-A947-70E740481C1C}">
                   <a14:useLocalDpi xmlns:a14="http://schemas.microsoft.com/office/drawing/2010/main" val="0"/>
@@ -3473,7 +3473,7 @@
             </a:ln>
             <a:extLst>
               <a:ext uri="{C572A759-6A51-4108-AA02-DFA0A04FC94B}">
-                <ma14:wrappingTextBoxFlag xmlns="" xmlns:m="http://schemas.openxmlformats.org/officeDocument/2006/math" xmlns:a14="http://schemas.microsoft.com/office/drawing/2010/main" xmlns:ma14="http://schemas.microsoft.com/office/mac/drawingml/2011/main" val="1"/>
+                <ma14:wrappingTextBoxFlag xmlns:ma14="http://schemas.microsoft.com/office/mac/drawingml/2011/main" xmlns:a14="http://schemas.microsoft.com/office/drawing/2010/main" xmlns:m="http://schemas.openxmlformats.org/officeDocument/2006/math" xmlns="" val="1"/>
               </a:ext>
             </a:extLst>
           </p:spPr>
@@ -3528,7 +3528,7 @@
           </a:ln>
           <a:extLst>
             <a:ext uri="{C572A759-6A51-4108-AA02-DFA0A04FC94B}">
-              <ma14:wrappingTextBoxFlag xmlns="" xmlns:m="http://schemas.openxmlformats.org/officeDocument/2006/math" xmlns:a14="http://schemas.microsoft.com/office/drawing/2010/main" xmlns:ma14="http://schemas.microsoft.com/office/mac/drawingml/2011/main" val="1"/>
+              <ma14:wrappingTextBoxFlag xmlns:ma14="http://schemas.microsoft.com/office/mac/drawingml/2011/main" xmlns:a14="http://schemas.microsoft.com/office/drawing/2010/main" xmlns:m="http://schemas.openxmlformats.org/officeDocument/2006/math" xmlns="" val="1"/>
             </a:ext>
           </a:extLst>
         </p:spPr>
@@ -3549,7 +3549,7 @@
           <a:p>
             <a:r>
               <a:rPr lang="en-US" dirty="0"/>
-              <a:t>Have we mere scratched the surface?</a:t>
+              <a:t>Have we merely scratched the surface?</a:t>
             </a:r>
             <a:endParaRPr dirty="0"/>
           </a:p>
@@ -3580,7 +3580,7 @@
           </a:ln>
           <a:extLst>
             <a:ext uri="{C572A759-6A51-4108-AA02-DFA0A04FC94B}">
-              <ma14:wrappingTextBoxFlag xmlns="" xmlns:m="http://schemas.openxmlformats.org/officeDocument/2006/math" xmlns:a14="http://schemas.microsoft.com/office/drawing/2010/main" xmlns:ma14="http://schemas.microsoft.com/office/mac/drawingml/2011/main" val="1"/>
+              <ma14:wrappingTextBoxFlag xmlns:ma14="http://schemas.microsoft.com/office/mac/drawingml/2011/main" xmlns:a14="http://schemas.microsoft.com/office/drawing/2010/main" xmlns:m="http://schemas.openxmlformats.org/officeDocument/2006/math" xmlns="" val="1"/>
             </a:ext>
           </a:extLst>
         </p:spPr>
@@ -3632,7 +3632,7 @@
           </a:ln>
           <a:extLst>
             <a:ext uri="{C572A759-6A51-4108-AA02-DFA0A04FC94B}">
-              <ma14:wrappingTextBoxFlag xmlns="" xmlns:m="http://schemas.openxmlformats.org/officeDocument/2006/math" xmlns:a14="http://schemas.microsoft.com/office/drawing/2010/main" xmlns:ma14="http://schemas.microsoft.com/office/mac/drawingml/2011/main" val="1"/>
+              <ma14:wrappingTextBoxFlag xmlns:ma14="http://schemas.microsoft.com/office/mac/drawingml/2011/main" xmlns:a14="http://schemas.microsoft.com/office/drawing/2010/main" xmlns:m="http://schemas.openxmlformats.org/officeDocument/2006/math" xmlns="" val="1"/>
             </a:ext>
           </a:extLst>
         </p:spPr>
@@ -3707,7 +3707,7 @@
             <p:nvPr/>
           </p:nvPicPr>
           <p:blipFill rotWithShape="1">
-            <a:blip r:embed="rId12">
+            <a:blip r:embed="rId11">
               <a:extLst>
                 <a:ext uri="{28A0092B-C50C-407E-A947-70E740481C1C}">
                   <a14:useLocalDpi xmlns:a14="http://schemas.microsoft.com/office/drawing/2010/main" val="0"/>
@@ -3752,7 +3752,7 @@
             </a:ln>
             <a:extLst>
               <a:ext uri="{C572A759-6A51-4108-AA02-DFA0A04FC94B}">
-                <ma14:wrappingTextBoxFlag xmlns="" xmlns:m="http://schemas.openxmlformats.org/officeDocument/2006/math" xmlns:a14="http://schemas.microsoft.com/office/drawing/2010/main" xmlns:ma14="http://schemas.microsoft.com/office/mac/drawingml/2011/main" val="1"/>
+                <ma14:wrappingTextBoxFlag xmlns:ma14="http://schemas.microsoft.com/office/mac/drawingml/2011/main" xmlns:a14="http://schemas.microsoft.com/office/drawing/2010/main" xmlns:m="http://schemas.openxmlformats.org/officeDocument/2006/math" xmlns="" val="1"/>
               </a:ext>
             </a:extLst>
           </p:spPr>
@@ -3807,7 +3807,7 @@
           </a:ln>
           <a:extLst>
             <a:ext uri="{C572A759-6A51-4108-AA02-DFA0A04FC94B}">
-              <ma14:wrappingTextBoxFlag xmlns="" xmlns:m="http://schemas.openxmlformats.org/officeDocument/2006/math" xmlns:a14="http://schemas.microsoft.com/office/drawing/2010/main" xmlns:ma14="http://schemas.microsoft.com/office/mac/drawingml/2011/main" val="1"/>
+              <ma14:wrappingTextBoxFlag xmlns:ma14="http://schemas.microsoft.com/office/mac/drawingml/2011/main" xmlns:a14="http://schemas.microsoft.com/office/drawing/2010/main" xmlns:m="http://schemas.openxmlformats.org/officeDocument/2006/math" xmlns="" val="1"/>
             </a:ext>
           </a:extLst>
         </p:spPr>
@@ -3859,7 +3859,7 @@
           </a:ln>
           <a:extLst>
             <a:ext uri="{C572A759-6A51-4108-AA02-DFA0A04FC94B}">
-              <ma14:wrappingTextBoxFlag xmlns="" xmlns:m="http://schemas.openxmlformats.org/officeDocument/2006/math" xmlns:a14="http://schemas.microsoft.com/office/drawing/2010/main" xmlns:ma14="http://schemas.microsoft.com/office/mac/drawingml/2011/main" val="1"/>
+              <ma14:wrappingTextBoxFlag xmlns:ma14="http://schemas.microsoft.com/office/mac/drawingml/2011/main" xmlns:a14="http://schemas.microsoft.com/office/drawing/2010/main" xmlns:m="http://schemas.openxmlformats.org/officeDocument/2006/math" xmlns="" val="1"/>
             </a:ext>
           </a:extLst>
         </p:spPr>
@@ -3890,7 +3890,7 @@
             </a:pPr>
             <a:r>
               <a:rPr lang="en-GB" dirty="0"/>
-              <a:t>Have added Threshold VAR for comparison (Figure 2).</a:t>
+              <a:t>We have added Threshold VAR for comparison (Figure 2).</a:t>
             </a:r>
           </a:p>
           <a:p>

</xml_diff>

<commit_message>
updated slides and some more tweaks on detailed poster
</commit_message>
<xml_diff>
--- a/poster/neurips.pptx
+++ b/poster/neurips.pptx
@@ -1528,6 +1528,18 @@
 <file path=ppt/slides/slide1.xml><?xml version="1.0" encoding="utf-8"?>
 <p:sld xmlns:a="http://schemas.openxmlformats.org/drawingml/2006/main" xmlns:r="http://schemas.openxmlformats.org/officeDocument/2006/relationships" xmlns:p="http://schemas.openxmlformats.org/presentationml/2006/main">
   <p:cSld>
+    <p:bg>
+      <p:bgPr>
+        <a:solidFill>
+          <a:schemeClr val="accent5">
+            <a:lumMod val="20000"/>
+            <a:lumOff val="80000"/>
+            <a:alpha val="48000"/>
+          </a:schemeClr>
+        </a:solidFill>
+        <a:effectLst/>
+      </p:bgPr>
+    </p:bg>
     <p:spTree>
       <p:nvGrpSpPr>
         <p:cNvPr id="1" name=""/>
@@ -2965,6 +2977,14 @@
             <a:chOff x="1003662" y="15344587"/>
             <a:chExt cx="9029701" cy="5099762"/>
           </a:xfrm>
+          <a:effectLst>
+            <a:outerShdw blurRad="50800" dist="38100" dir="2700000" algn="tl" rotWithShape="0">
+              <a:schemeClr val="accent1">
+                <a:lumMod val="75000"/>
+                <a:alpha val="40000"/>
+              </a:schemeClr>
+            </a:outerShdw>
+          </a:effectLst>
         </p:grpSpPr>
         <p:sp>
           <p:nvSpPr>
@@ -3072,10 +3092,10 @@
       </p:grpSp>
       <p:grpSp>
         <p:nvGrpSpPr>
-          <p:cNvPr id="2" name="Group 1">
+          <p:cNvPr id="3" name="Group 2">
             <a:extLst>
               <a:ext uri="{FF2B5EF4-FFF2-40B4-BE49-F238E27FC236}">
-                <a16:creationId xmlns:a16="http://schemas.microsoft.com/office/drawing/2014/main" id="{05F54B41-E300-7F4C-B864-8382275B7DC3}"/>
+                <a16:creationId xmlns:a16="http://schemas.microsoft.com/office/drawing/2014/main" id="{7A1BEA9F-D20F-CF43-ACB2-1A4D5FC0428A}"/>
               </a:ext>
             </a:extLst>
           </p:cNvPr>
@@ -3084,11 +3104,19 @@
         </p:nvGrpSpPr>
         <p:grpSpPr>
           <a:xfrm>
-            <a:off x="11549413" y="8858358"/>
-            <a:ext cx="9727046" cy="6502077"/>
-            <a:chOff x="11414683" y="8542954"/>
-            <a:chExt cx="9727046" cy="6502077"/>
+            <a:off x="11898085" y="8858358"/>
+            <a:ext cx="9026547" cy="6371649"/>
+            <a:chOff x="11898085" y="8858358"/>
+            <a:chExt cx="9378374" cy="6554798"/>
           </a:xfrm>
+          <a:effectLst>
+            <a:outerShdw blurRad="50800" dist="38100" dir="2700000" algn="tl" rotWithShape="0">
+              <a:schemeClr val="accent1">
+                <a:lumMod val="75000"/>
+                <a:alpha val="40000"/>
+              </a:schemeClr>
+            </a:outerShdw>
+          </a:effectLst>
         </p:grpSpPr>
         <p:sp>
           <p:nvSpPr>
@@ -3098,7 +3126,7 @@
           </p:nvSpPr>
           <p:spPr>
             <a:xfrm>
-              <a:off x="11414683" y="14752643"/>
+              <a:off x="11898085" y="15120768"/>
               <a:ext cx="9029701" cy="292388"/>
             </a:xfrm>
             <a:prstGeom prst="rect">
@@ -3172,7 +3200,7 @@
           </p:blipFill>
           <p:spPr bwMode="auto">
             <a:xfrm>
-              <a:off x="11776671" y="8542954"/>
+              <a:off x="11911401" y="8858358"/>
               <a:ext cx="9365058" cy="6243372"/>
             </a:xfrm>
             <a:prstGeom prst="rect">
@@ -3263,42 +3291,6 @@
           </a:prstGeom>
         </p:spPr>
       </p:pic>
-      <p:pic>
-        <p:nvPicPr>
-          <p:cNvPr id="8" name="Picture 7" descr="Qr code&#10;&#10;Description automatically generated">
-            <a:extLst>
-              <a:ext uri="{FF2B5EF4-FFF2-40B4-BE49-F238E27FC236}">
-                <a16:creationId xmlns:a16="http://schemas.microsoft.com/office/drawing/2014/main" id="{7679F7EA-A521-C640-ABE4-5F6EDDCD8ACB}"/>
-              </a:ext>
-            </a:extLst>
-          </p:cNvPr>
-          <p:cNvPicPr>
-            <a:picLocks noChangeAspect="1"/>
-          </p:cNvPicPr>
-          <p:nvPr/>
-        </p:nvPicPr>
-        <p:blipFill>
-          <a:blip r:embed="rId9">
-            <a:extLst>
-              <a:ext uri="{28A0092B-C50C-407E-A947-70E740481C1C}">
-                <a14:useLocalDpi xmlns:a14="http://schemas.microsoft.com/office/drawing/2010/main" val="0"/>
-              </a:ext>
-            </a:extLst>
-          </a:blip>
-          <a:stretch>
-            <a:fillRect/>
-          </a:stretch>
-        </p:blipFill>
-        <p:spPr>
-          <a:xfrm>
-            <a:off x="30121035" y="19200526"/>
-            <a:ext cx="2648507" cy="2648507"/>
-          </a:xfrm>
-          <a:prstGeom prst="rect">
-            <a:avLst/>
-          </a:prstGeom>
-        </p:spPr>
-      </p:pic>
       <p:sp>
         <p:nvSpPr>
           <p:cNvPr id="56" name="TextBox 41">
@@ -3383,10 +3375,10 @@
       </p:sp>
       <p:grpSp>
         <p:nvGrpSpPr>
-          <p:cNvPr id="9" name="Group 8">
+          <p:cNvPr id="8" name="Group 7">
             <a:extLst>
               <a:ext uri="{FF2B5EF4-FFF2-40B4-BE49-F238E27FC236}">
-                <a16:creationId xmlns:a16="http://schemas.microsoft.com/office/drawing/2014/main" id="{973BD854-A0E9-F247-BDA9-4C056474DC09}"/>
+                <a16:creationId xmlns:a16="http://schemas.microsoft.com/office/drawing/2014/main" id="{F6027360-842E-5344-9E4F-41740FD3F655}"/>
               </a:ext>
             </a:extLst>
           </p:cNvPr>
@@ -3395,11 +3387,19 @@
         </p:nvGrpSpPr>
         <p:grpSpPr>
           <a:xfrm>
-            <a:off x="22788099" y="6982050"/>
-            <a:ext cx="9072266" cy="3895472"/>
-            <a:chOff x="22860000" y="7171884"/>
-            <a:chExt cx="9072266" cy="3895472"/>
+            <a:off x="22792507" y="6982050"/>
+            <a:ext cx="9067858" cy="3961075"/>
+            <a:chOff x="22792507" y="6982050"/>
+            <a:chExt cx="9067858" cy="3961075"/>
           </a:xfrm>
+          <a:effectLst>
+            <a:outerShdw blurRad="50800" dist="38100" dir="2700000" algn="tl" rotWithShape="0">
+              <a:schemeClr val="accent1">
+                <a:lumMod val="75000"/>
+                <a:alpha val="40000"/>
+              </a:schemeClr>
+            </a:outerShdw>
+          </a:effectLst>
         </p:grpSpPr>
         <p:pic>
           <p:nvPicPr>
@@ -3416,7 +3416,7 @@
             <p:nvPr/>
           </p:nvPicPr>
           <p:blipFill>
-            <a:blip r:embed="rId10">
+            <a:blip r:embed="rId9">
               <a:extLst>
                 <a:ext uri="{28A0092B-C50C-407E-A947-70E740481C1C}">
                   <a14:useLocalDpi xmlns:a14="http://schemas.microsoft.com/office/drawing/2010/main" val="0"/>
@@ -3430,7 +3430,7 @@
           </p:blipFill>
           <p:spPr bwMode="auto">
             <a:xfrm>
-              <a:off x="22905719" y="7171884"/>
+              <a:off x="22833818" y="6982050"/>
               <a:ext cx="9026547" cy="3610619"/>
             </a:xfrm>
             <a:prstGeom prst="rect">
@@ -3462,7 +3462,7 @@
           </p:nvSpPr>
           <p:spPr>
             <a:xfrm>
-              <a:off x="22860000" y="10774968"/>
+              <a:off x="22792507" y="10650737"/>
               <a:ext cx="9029701" cy="292388"/>
             </a:xfrm>
             <a:prstGeom prst="rect">
@@ -3621,7 +3621,7 @@
         </p:nvSpPr>
         <p:spPr>
           <a:xfrm>
-            <a:off x="11911401" y="15656571"/>
+            <a:off x="11910901" y="15468186"/>
             <a:ext cx="9130938" cy="1607876"/>
           </a:xfrm>
           <a:prstGeom prst="rect">
@@ -3674,10 +3674,10 @@
       </p:sp>
       <p:grpSp>
         <p:nvGrpSpPr>
-          <p:cNvPr id="16" name="Group 15">
+          <p:cNvPr id="7" name="Group 6">
             <a:extLst>
               <a:ext uri="{FF2B5EF4-FFF2-40B4-BE49-F238E27FC236}">
-                <a16:creationId xmlns:a16="http://schemas.microsoft.com/office/drawing/2014/main" id="{B51275BD-9B99-8842-B439-3B545D82D7FF}"/>
+                <a16:creationId xmlns:a16="http://schemas.microsoft.com/office/drawing/2014/main" id="{4A038207-7452-2C48-BB11-03E07A1C2423}"/>
               </a:ext>
             </a:extLst>
           </p:cNvPr>
@@ -3686,11 +3686,19 @@
         </p:nvGrpSpPr>
         <p:grpSpPr>
           <a:xfrm>
-            <a:off x="11549413" y="17529970"/>
-            <a:ext cx="9029701" cy="2914379"/>
-            <a:chOff x="11549413" y="17529970"/>
-            <a:chExt cx="9029701" cy="2914379"/>
+            <a:off x="11944349" y="17444427"/>
+            <a:ext cx="9029701" cy="2999922"/>
+            <a:chOff x="11545131" y="17529970"/>
+            <a:chExt cx="9029701" cy="2999922"/>
           </a:xfrm>
+          <a:effectLst>
+            <a:outerShdw blurRad="50800" dist="38100" dir="2700000" algn="tl" rotWithShape="0">
+              <a:schemeClr val="accent1">
+                <a:lumMod val="75000"/>
+                <a:alpha val="40000"/>
+              </a:schemeClr>
+            </a:outerShdw>
+          </a:effectLst>
         </p:grpSpPr>
         <p:pic>
           <p:nvPicPr>
@@ -3707,7 +3715,7 @@
             <p:nvPr/>
           </p:nvPicPr>
           <p:blipFill rotWithShape="1">
-            <a:blip r:embed="rId11">
+            <a:blip r:embed="rId10">
               <a:extLst>
                 <a:ext uri="{28A0092B-C50C-407E-A947-70E740481C1C}">
                   <a14:useLocalDpi xmlns:a14="http://schemas.microsoft.com/office/drawing/2010/main" val="0"/>
@@ -3741,7 +3749,7 @@
           </p:nvSpPr>
           <p:spPr>
             <a:xfrm>
-              <a:off x="11549413" y="20151961"/>
+              <a:off x="11545131" y="20237504"/>
               <a:ext cx="9029701" cy="292388"/>
             </a:xfrm>
             <a:prstGeom prst="rect">
@@ -3929,6 +3937,42 @@
           </a:p>
         </p:txBody>
       </p:sp>
+      <p:pic>
+        <p:nvPicPr>
+          <p:cNvPr id="5" name="Picture 4" descr="Qr code&#10;&#10;Description automatically generated">
+            <a:extLst>
+              <a:ext uri="{FF2B5EF4-FFF2-40B4-BE49-F238E27FC236}">
+                <a16:creationId xmlns:a16="http://schemas.microsoft.com/office/drawing/2014/main" id="{1BA5EF1C-A3F9-2344-8B2A-16173F588012}"/>
+              </a:ext>
+            </a:extLst>
+          </p:cNvPr>
+          <p:cNvPicPr>
+            <a:picLocks noChangeAspect="1"/>
+          </p:cNvPicPr>
+          <p:nvPr/>
+        </p:nvPicPr>
+        <p:blipFill>
+          <a:blip r:embed="rId11">
+            <a:extLst>
+              <a:ext uri="{28A0092B-C50C-407E-A947-70E740481C1C}">
+                <a14:useLocalDpi xmlns:a14="http://schemas.microsoft.com/office/drawing/2010/main" val="0"/>
+              </a:ext>
+            </a:extLst>
+          </a:blip>
+          <a:stretch>
+            <a:fillRect/>
+          </a:stretch>
+        </p:blipFill>
+        <p:spPr>
+          <a:xfrm>
+            <a:off x="30189421" y="19322632"/>
+            <a:ext cx="2414521" cy="2414521"/>
+          </a:xfrm>
+          <a:prstGeom prst="rect">
+            <a:avLst/>
+          </a:prstGeom>
+        </p:spPr>
+      </p:pic>
     </p:spTree>
   </p:cSld>
   <p:clrMapOvr>

</xml_diff>